<commit_message>
updated ppt with link
</commit_message>
<xml_diff>
--- a/Cost-Effective Real-TIme Ride Sharing Platform.pptx
+++ b/Cost-Effective Real-TIme Ride Sharing Platform.pptx
@@ -11482,6 +11482,67 @@
             <a:tailEnd type="diamond" len="lg" w="lg"/>
           </a:ln>
         </p:spPr>
+      </p:sp>
+      <p:sp>
+        <p:nvSpPr>
+          <p:cNvPr name="TextBox 38" id="38"/>
+          <p:cNvSpPr txBox="true"/>
+          <p:nvPr/>
+        </p:nvSpPr>
+        <p:spPr>
+          <a:xfrm rot="0">
+            <a:off x="9339948" y="9344966"/>
+            <a:ext cx="8374794" cy="538068"/>
+          </a:xfrm>
+          <a:prstGeom prst="rect">
+            <a:avLst/>
+          </a:prstGeom>
+        </p:spPr>
+        <p:txBody>
+          <a:bodyPr anchor="t" rtlCol="false" tIns="0" lIns="0" bIns="0" rIns="0">
+            <a:spAutoFit/>
+          </a:bodyPr>
+          <a:lstStyle/>
+          <a:p>
+            <a:pPr algn="l">
+              <a:lnSpc>
+                <a:spcPts val="2058"/>
+              </a:lnSpc>
+            </a:pPr>
+            <a:r>
+              <a:rPr lang="en-US" sz="2058" spc="92">
+                <a:solidFill>
+                  <a:srgbClr val="292828"/>
+                </a:solidFill>
+                <a:latin typeface="Gotham"/>
+                <a:ea typeface="Gotham"/>
+                <a:cs typeface="Gotham"/>
+                <a:sym typeface="Gotham"/>
+              </a:rPr>
+              <a:t>Project GitHub Link: </a:t>
+            </a:r>
+          </a:p>
+          <a:p>
+            <a:pPr algn="ctr">
+              <a:lnSpc>
+                <a:spcPts val="2058"/>
+              </a:lnSpc>
+            </a:pPr>
+            <a:r>
+              <a:rPr lang="en-US" sz="2058" spc="92" u="sng">
+                <a:solidFill>
+                  <a:srgbClr val="292828"/>
+                </a:solidFill>
+                <a:latin typeface="Gotham"/>
+                <a:ea typeface="Gotham"/>
+                <a:cs typeface="Gotham"/>
+                <a:sym typeface="Gotham"/>
+                <a:hlinkClick r:id="rId17" tooltip="https://github.com/amruth-k99/ride-sharing-platform"/>
+              </a:rPr>
+              <a:t>https://github.com/amruth-k99/ride-sharing-platform</a:t>
+            </a:r>
+          </a:p>
+        </p:txBody>
       </p:sp>
     </p:spTree>
   </p:cSld>

</xml_diff>